<commit_message>
#61459 - HSLFShape.getShapeName() returns name of shapeType and not the shape name
git-svn-id: https://svn.apache.org/repos/asf/poi/trunk@1829656 13f79535-47bb-0310-9956-ffa450edef68
</commit_message>
<xml_diff>
--- a/test-data/slideshow/SampleShow.pptx
+++ b/test-data/slideshow/SampleShow.pptx
@@ -108,6 +108,22 @@
       </a:defRPr>
     </a:lvl9pPr>
   </p:defaultTextStyle>
+  <p:extLst>
+    <p:ext uri="{EFAFB233-063F-42B5-8137-9DF3F51BA10A}">
+      <p15:sldGuideLst xmlns:p15="http://schemas.microsoft.com/office/powerpoint/2012/main">
+        <p15:guide id="1" orient="horz" pos="2160">
+          <p15:clr>
+            <a:srgbClr val="A4A3A4"/>
+          </p15:clr>
+        </p15:guide>
+        <p15:guide id="2" pos="2880">
+          <p15:clr>
+            <a:srgbClr val="A4A3A4"/>
+          </p15:clr>
+        </p15:guide>
+      </p15:sldGuideLst>
+    </p:ext>
+  </p:extLst>
 </p:presentation>
 </file>
 
@@ -193,7 +209,7 @@
           <a:p>
             <a:fld id="{5C618275-17F5-4401-83B6-631DB90C16C8}" type="datetimeFigureOut">
               <a:rPr lang="en-US" smtClean="0"/>
-              <a:t>1/4/2008</a:t>
+              <a:t>4/18/2018</a:t>
             </a:fld>
             <a:endParaRPr lang="en-US"/>
           </a:p>
@@ -259,38 +275,37 @@
           <a:p>
             <a:pPr lvl="0"/>
             <a:r>
-              <a:rPr lang="en-US" smtClean="0"/>
+              <a:rPr lang="en-US"/>
               <a:t>Click to edit Master text styles</a:t>
             </a:r>
           </a:p>
           <a:p>
             <a:pPr lvl="1"/>
             <a:r>
-              <a:rPr lang="en-US" smtClean="0"/>
+              <a:rPr lang="en-US"/>
               <a:t>Second level</a:t>
             </a:r>
           </a:p>
           <a:p>
             <a:pPr lvl="2"/>
             <a:r>
-              <a:rPr lang="en-US" smtClean="0"/>
+              <a:rPr lang="en-US"/>
               <a:t>Third level</a:t>
             </a:r>
           </a:p>
           <a:p>
             <a:pPr lvl="3"/>
             <a:r>
-              <a:rPr lang="en-US" smtClean="0"/>
+              <a:rPr lang="en-US"/>
               <a:t>Fourth level</a:t>
             </a:r>
           </a:p>
           <a:p>
             <a:pPr lvl="4"/>
             <a:r>
-              <a:rPr lang="en-US" smtClean="0"/>
+              <a:rPr lang="en-US"/>
               <a:t>Fifth level</a:t>
             </a:r>
-            <a:endParaRPr lang="en-US"/>
           </a:p>
         </p:txBody>
       </p:sp>
@@ -505,7 +520,7 @@
           <a:lstStyle/>
           <a:p>
             <a:r>
-              <a:rPr lang="en-GB" dirty="0" smtClean="0"/>
+              <a:rPr lang="en-GB" dirty="0"/>
               <a:t>I am the notes of the first slide</a:t>
             </a:r>
             <a:endParaRPr lang="en-US" dirty="0"/>
@@ -590,21 +605,21 @@
           <a:lstStyle/>
           <a:p>
             <a:r>
-              <a:rPr lang="en-GB" dirty="0" smtClean="0"/>
+              <a:rPr lang="en-GB" dirty="0"/>
               <a:t>These are the notes of the 2</a:t>
             </a:r>
             <a:r>
-              <a:rPr lang="en-GB" baseline="30000" dirty="0" smtClean="0"/>
+              <a:rPr lang="en-GB" baseline="30000" dirty="0"/>
               <a:t>nd</a:t>
             </a:r>
             <a:r>
-              <a:rPr lang="en-GB" baseline="0" dirty="0" smtClean="0"/>
+              <a:rPr lang="en-GB" baseline="0" dirty="0"/>
               <a:t> slide</a:t>
             </a:r>
           </a:p>
           <a:p>
             <a:r>
-              <a:rPr lang="en-GB" b="1" baseline="0" smtClean="0"/>
+              <a:rPr lang="en-GB" b="1" baseline="0"/>
               <a:t>THIS LINE IS BOLD</a:t>
             </a:r>
             <a:endParaRPr lang="en-US" b="1"/>
@@ -680,10 +695,9 @@
           <a:lstStyle/>
           <a:p>
             <a:r>
-              <a:rPr lang="en-US" smtClean="0"/>
+              <a:rPr lang="en-US"/>
               <a:t>Click to edit Master title style</a:t>
             </a:r>
-            <a:endParaRPr lang="en-US"/>
           </a:p>
         </p:txBody>
       </p:sp>
@@ -799,10 +813,9 @@
           </a:lstStyle>
           <a:p>
             <a:r>
-              <a:rPr lang="en-US" smtClean="0"/>
+              <a:rPr lang="en-US"/>
               <a:t>Click to edit Master subtitle style</a:t>
             </a:r>
-            <a:endParaRPr lang="en-US"/>
           </a:p>
         </p:txBody>
       </p:sp>
@@ -823,7 +836,7 @@
           <a:p>
             <a:fld id="{9EC64373-BFDA-45AB-A1CB-3ABEFE139FC3}" type="datetimeFigureOut">
               <a:rPr lang="en-US" smtClean="0"/>
-              <a:t>1/4/2008</a:t>
+              <a:t>4/18/2018</a:t>
             </a:fld>
             <a:endParaRPr lang="en-US"/>
           </a:p>
@@ -912,10 +925,9 @@
           <a:lstStyle/>
           <a:p>
             <a:r>
-              <a:rPr lang="en-US" smtClean="0"/>
+              <a:rPr lang="en-US"/>
               <a:t>Click to edit Master title style</a:t>
             </a:r>
-            <a:endParaRPr lang="en-US"/>
           </a:p>
         </p:txBody>
       </p:sp>
@@ -936,38 +948,37 @@
           <a:p>
             <a:pPr lvl="0"/>
             <a:r>
-              <a:rPr lang="en-US" smtClean="0"/>
+              <a:rPr lang="en-US"/>
               <a:t>Click to edit Master text styles</a:t>
             </a:r>
           </a:p>
           <a:p>
             <a:pPr lvl="1"/>
             <a:r>
-              <a:rPr lang="en-US" smtClean="0"/>
+              <a:rPr lang="en-US"/>
               <a:t>Second level</a:t>
             </a:r>
           </a:p>
           <a:p>
             <a:pPr lvl="2"/>
             <a:r>
-              <a:rPr lang="en-US" smtClean="0"/>
+              <a:rPr lang="en-US"/>
               <a:t>Third level</a:t>
             </a:r>
           </a:p>
           <a:p>
             <a:pPr lvl="3"/>
             <a:r>
-              <a:rPr lang="en-US" smtClean="0"/>
+              <a:rPr lang="en-US"/>
               <a:t>Fourth level</a:t>
             </a:r>
           </a:p>
           <a:p>
             <a:pPr lvl="4"/>
             <a:r>
-              <a:rPr lang="en-US" smtClean="0"/>
+              <a:rPr lang="en-US"/>
               <a:t>Fifth level</a:t>
             </a:r>
-            <a:endParaRPr lang="en-US"/>
           </a:p>
         </p:txBody>
       </p:sp>
@@ -988,7 +999,7 @@
           <a:p>
             <a:fld id="{9EC64373-BFDA-45AB-A1CB-3ABEFE139FC3}" type="datetimeFigureOut">
               <a:rPr lang="en-US" smtClean="0"/>
-              <a:t>1/4/2008</a:t>
+              <a:t>4/18/2018</a:t>
             </a:fld>
             <a:endParaRPr lang="en-US"/>
           </a:p>
@@ -1082,10 +1093,9 @@
           <a:lstStyle/>
           <a:p>
             <a:r>
-              <a:rPr lang="en-US" smtClean="0"/>
+              <a:rPr lang="en-US"/>
               <a:t>Click to edit Master title style</a:t>
             </a:r>
-            <a:endParaRPr lang="en-US"/>
           </a:p>
         </p:txBody>
       </p:sp>
@@ -1111,38 +1121,37 @@
           <a:p>
             <a:pPr lvl="0"/>
             <a:r>
-              <a:rPr lang="en-US" smtClean="0"/>
+              <a:rPr lang="en-US"/>
               <a:t>Click to edit Master text styles</a:t>
             </a:r>
           </a:p>
           <a:p>
             <a:pPr lvl="1"/>
             <a:r>
-              <a:rPr lang="en-US" smtClean="0"/>
+              <a:rPr lang="en-US"/>
               <a:t>Second level</a:t>
             </a:r>
           </a:p>
           <a:p>
             <a:pPr lvl="2"/>
             <a:r>
-              <a:rPr lang="en-US" smtClean="0"/>
+              <a:rPr lang="en-US"/>
               <a:t>Third level</a:t>
             </a:r>
           </a:p>
           <a:p>
             <a:pPr lvl="3"/>
             <a:r>
-              <a:rPr lang="en-US" smtClean="0"/>
+              <a:rPr lang="en-US"/>
               <a:t>Fourth level</a:t>
             </a:r>
           </a:p>
           <a:p>
             <a:pPr lvl="4"/>
             <a:r>
-              <a:rPr lang="en-US" smtClean="0"/>
+              <a:rPr lang="en-US"/>
               <a:t>Fifth level</a:t>
             </a:r>
-            <a:endParaRPr lang="en-US"/>
           </a:p>
         </p:txBody>
       </p:sp>
@@ -1163,7 +1172,7 @@
           <a:p>
             <a:fld id="{9EC64373-BFDA-45AB-A1CB-3ABEFE139FC3}" type="datetimeFigureOut">
               <a:rPr lang="en-US" smtClean="0"/>
-              <a:t>1/4/2008</a:t>
+              <a:t>4/18/2018</a:t>
             </a:fld>
             <a:endParaRPr lang="en-US"/>
           </a:p>
@@ -1252,10 +1261,9 @@
           <a:lstStyle/>
           <a:p>
             <a:r>
-              <a:rPr lang="en-US" smtClean="0"/>
+              <a:rPr lang="en-US"/>
               <a:t>Click to edit Master title style</a:t>
             </a:r>
-            <a:endParaRPr lang="en-US"/>
           </a:p>
         </p:txBody>
       </p:sp>
@@ -1276,38 +1284,37 @@
           <a:p>
             <a:pPr lvl="0"/>
             <a:r>
-              <a:rPr lang="en-US" smtClean="0"/>
+              <a:rPr lang="en-US"/>
               <a:t>Click to edit Master text styles</a:t>
             </a:r>
           </a:p>
           <a:p>
             <a:pPr lvl="1"/>
             <a:r>
-              <a:rPr lang="en-US" smtClean="0"/>
+              <a:rPr lang="en-US"/>
               <a:t>Second level</a:t>
             </a:r>
           </a:p>
           <a:p>
             <a:pPr lvl="2"/>
             <a:r>
-              <a:rPr lang="en-US" smtClean="0"/>
+              <a:rPr lang="en-US"/>
               <a:t>Third level</a:t>
             </a:r>
           </a:p>
           <a:p>
             <a:pPr lvl="3"/>
             <a:r>
-              <a:rPr lang="en-US" smtClean="0"/>
+              <a:rPr lang="en-US"/>
               <a:t>Fourth level</a:t>
             </a:r>
           </a:p>
           <a:p>
             <a:pPr lvl="4"/>
             <a:r>
-              <a:rPr lang="en-US" smtClean="0"/>
+              <a:rPr lang="en-US"/>
               <a:t>Fifth level</a:t>
             </a:r>
-            <a:endParaRPr lang="en-US"/>
           </a:p>
         </p:txBody>
       </p:sp>
@@ -1328,7 +1335,7 @@
           <a:p>
             <a:fld id="{9EC64373-BFDA-45AB-A1CB-3ABEFE139FC3}" type="datetimeFigureOut">
               <a:rPr lang="en-US" smtClean="0"/>
-              <a:t>1/4/2008</a:t>
+              <a:t>4/18/2018</a:t>
             </a:fld>
             <a:endParaRPr lang="en-US"/>
           </a:p>
@@ -1426,10 +1433,9 @@
           </a:lstStyle>
           <a:p>
             <a:r>
-              <a:rPr lang="en-US" smtClean="0"/>
+              <a:rPr lang="en-US"/>
               <a:t>Click to edit Master title style</a:t>
             </a:r>
-            <a:endParaRPr lang="en-US"/>
           </a:p>
         </p:txBody>
       </p:sp>
@@ -1546,7 +1552,7 @@
           <a:p>
             <a:pPr lvl="0"/>
             <a:r>
-              <a:rPr lang="en-US" smtClean="0"/>
+              <a:rPr lang="en-US"/>
               <a:t>Click to edit Master text styles</a:t>
             </a:r>
           </a:p>
@@ -1569,7 +1575,7 @@
           <a:p>
             <a:fld id="{9EC64373-BFDA-45AB-A1CB-3ABEFE139FC3}" type="datetimeFigureOut">
               <a:rPr lang="en-US" smtClean="0"/>
-              <a:t>1/4/2008</a:t>
+              <a:t>4/18/2018</a:t>
             </a:fld>
             <a:endParaRPr lang="en-US"/>
           </a:p>
@@ -1658,10 +1664,9 @@
           <a:lstStyle/>
           <a:p>
             <a:r>
-              <a:rPr lang="en-US" smtClean="0"/>
+              <a:rPr lang="en-US"/>
               <a:t>Click to edit Master title style</a:t>
             </a:r>
-            <a:endParaRPr lang="en-US"/>
           </a:p>
         </p:txBody>
       </p:sp>
@@ -1715,38 +1720,37 @@
           <a:p>
             <a:pPr lvl="0"/>
             <a:r>
-              <a:rPr lang="en-US" smtClean="0"/>
+              <a:rPr lang="en-US"/>
               <a:t>Click to edit Master text styles</a:t>
             </a:r>
           </a:p>
           <a:p>
             <a:pPr lvl="1"/>
             <a:r>
-              <a:rPr lang="en-US" smtClean="0"/>
+              <a:rPr lang="en-US"/>
               <a:t>Second level</a:t>
             </a:r>
           </a:p>
           <a:p>
             <a:pPr lvl="2"/>
             <a:r>
-              <a:rPr lang="en-US" smtClean="0"/>
+              <a:rPr lang="en-US"/>
               <a:t>Third level</a:t>
             </a:r>
           </a:p>
           <a:p>
             <a:pPr lvl="3"/>
             <a:r>
-              <a:rPr lang="en-US" smtClean="0"/>
+              <a:rPr lang="en-US"/>
               <a:t>Fourth level</a:t>
             </a:r>
           </a:p>
           <a:p>
             <a:pPr lvl="4"/>
             <a:r>
-              <a:rPr lang="en-US" smtClean="0"/>
+              <a:rPr lang="en-US"/>
               <a:t>Fifth level</a:t>
             </a:r>
-            <a:endParaRPr lang="en-US"/>
           </a:p>
         </p:txBody>
       </p:sp>
@@ -1800,38 +1804,37 @@
           <a:p>
             <a:pPr lvl="0"/>
             <a:r>
-              <a:rPr lang="en-US" smtClean="0"/>
+              <a:rPr lang="en-US"/>
               <a:t>Click to edit Master text styles</a:t>
             </a:r>
           </a:p>
           <a:p>
             <a:pPr lvl="1"/>
             <a:r>
-              <a:rPr lang="en-US" smtClean="0"/>
+              <a:rPr lang="en-US"/>
               <a:t>Second level</a:t>
             </a:r>
           </a:p>
           <a:p>
             <a:pPr lvl="2"/>
             <a:r>
-              <a:rPr lang="en-US" smtClean="0"/>
+              <a:rPr lang="en-US"/>
               <a:t>Third level</a:t>
             </a:r>
           </a:p>
           <a:p>
             <a:pPr lvl="3"/>
             <a:r>
-              <a:rPr lang="en-US" smtClean="0"/>
+              <a:rPr lang="en-US"/>
               <a:t>Fourth level</a:t>
             </a:r>
           </a:p>
           <a:p>
             <a:pPr lvl="4"/>
             <a:r>
-              <a:rPr lang="en-US" smtClean="0"/>
+              <a:rPr lang="en-US"/>
               <a:t>Fifth level</a:t>
             </a:r>
-            <a:endParaRPr lang="en-US"/>
           </a:p>
         </p:txBody>
       </p:sp>
@@ -1852,7 +1855,7 @@
           <a:p>
             <a:fld id="{9EC64373-BFDA-45AB-A1CB-3ABEFE139FC3}" type="datetimeFigureOut">
               <a:rPr lang="en-US" smtClean="0"/>
-              <a:t>1/4/2008</a:t>
+              <a:t>4/18/2018</a:t>
             </a:fld>
             <a:endParaRPr lang="en-US"/>
           </a:p>
@@ -1945,10 +1948,9 @@
           </a:lstStyle>
           <a:p>
             <a:r>
-              <a:rPr lang="en-US" smtClean="0"/>
+              <a:rPr lang="en-US"/>
               <a:t>Click to edit Master title style</a:t>
             </a:r>
-            <a:endParaRPr lang="en-US"/>
           </a:p>
         </p:txBody>
       </p:sp>
@@ -2011,7 +2013,7 @@
           <a:p>
             <a:pPr lvl="0"/>
             <a:r>
-              <a:rPr lang="en-US" smtClean="0"/>
+              <a:rPr lang="en-US"/>
               <a:t>Click to edit Master text styles</a:t>
             </a:r>
           </a:p>
@@ -2067,38 +2069,37 @@
           <a:p>
             <a:pPr lvl="0"/>
             <a:r>
-              <a:rPr lang="en-US" smtClean="0"/>
+              <a:rPr lang="en-US"/>
               <a:t>Click to edit Master text styles</a:t>
             </a:r>
           </a:p>
           <a:p>
             <a:pPr lvl="1"/>
             <a:r>
-              <a:rPr lang="en-US" smtClean="0"/>
+              <a:rPr lang="en-US"/>
               <a:t>Second level</a:t>
             </a:r>
           </a:p>
           <a:p>
             <a:pPr lvl="2"/>
             <a:r>
-              <a:rPr lang="en-US" smtClean="0"/>
+              <a:rPr lang="en-US"/>
               <a:t>Third level</a:t>
             </a:r>
           </a:p>
           <a:p>
             <a:pPr lvl="3"/>
             <a:r>
-              <a:rPr lang="en-US" smtClean="0"/>
+              <a:rPr lang="en-US"/>
               <a:t>Fourth level</a:t>
             </a:r>
           </a:p>
           <a:p>
             <a:pPr lvl="4"/>
             <a:r>
-              <a:rPr lang="en-US" smtClean="0"/>
+              <a:rPr lang="en-US"/>
               <a:t>Fifth level</a:t>
             </a:r>
-            <a:endParaRPr lang="en-US"/>
           </a:p>
         </p:txBody>
       </p:sp>
@@ -2161,7 +2162,7 @@
           <a:p>
             <a:pPr lvl="0"/>
             <a:r>
-              <a:rPr lang="en-US" smtClean="0"/>
+              <a:rPr lang="en-US"/>
               <a:t>Click to edit Master text styles</a:t>
             </a:r>
           </a:p>
@@ -2217,38 +2218,37 @@
           <a:p>
             <a:pPr lvl="0"/>
             <a:r>
-              <a:rPr lang="en-US" smtClean="0"/>
+              <a:rPr lang="en-US"/>
               <a:t>Click to edit Master text styles</a:t>
             </a:r>
           </a:p>
           <a:p>
             <a:pPr lvl="1"/>
             <a:r>
-              <a:rPr lang="en-US" smtClean="0"/>
+              <a:rPr lang="en-US"/>
               <a:t>Second level</a:t>
             </a:r>
           </a:p>
           <a:p>
             <a:pPr lvl="2"/>
             <a:r>
-              <a:rPr lang="en-US" smtClean="0"/>
+              <a:rPr lang="en-US"/>
               <a:t>Third level</a:t>
             </a:r>
           </a:p>
           <a:p>
             <a:pPr lvl="3"/>
             <a:r>
-              <a:rPr lang="en-US" smtClean="0"/>
+              <a:rPr lang="en-US"/>
               <a:t>Fourth level</a:t>
             </a:r>
           </a:p>
           <a:p>
             <a:pPr lvl="4"/>
             <a:r>
-              <a:rPr lang="en-US" smtClean="0"/>
+              <a:rPr lang="en-US"/>
               <a:t>Fifth level</a:t>
             </a:r>
-            <a:endParaRPr lang="en-US"/>
           </a:p>
         </p:txBody>
       </p:sp>
@@ -2269,7 +2269,7 @@
           <a:p>
             <a:fld id="{9EC64373-BFDA-45AB-A1CB-3ABEFE139FC3}" type="datetimeFigureOut">
               <a:rPr lang="en-US" smtClean="0"/>
-              <a:t>1/4/2008</a:t>
+              <a:t>4/18/2018</a:t>
             </a:fld>
             <a:endParaRPr lang="en-US"/>
           </a:p>
@@ -2358,10 +2358,9 @@
           <a:lstStyle/>
           <a:p>
             <a:r>
-              <a:rPr lang="en-US" smtClean="0"/>
+              <a:rPr lang="en-US"/>
               <a:t>Click to edit Master title style</a:t>
             </a:r>
-            <a:endParaRPr lang="en-US"/>
           </a:p>
         </p:txBody>
       </p:sp>
@@ -2382,7 +2381,7 @@
           <a:p>
             <a:fld id="{9EC64373-BFDA-45AB-A1CB-3ABEFE139FC3}" type="datetimeFigureOut">
               <a:rPr lang="en-US" smtClean="0"/>
-              <a:t>1/4/2008</a:t>
+              <a:t>4/18/2018</a:t>
             </a:fld>
             <a:endParaRPr lang="en-US"/>
           </a:p>
@@ -2472,7 +2471,7 @@
           <a:p>
             <a:fld id="{9EC64373-BFDA-45AB-A1CB-3ABEFE139FC3}" type="datetimeFigureOut">
               <a:rPr lang="en-US" smtClean="0"/>
-              <a:t>1/4/2008</a:t>
+              <a:t>4/18/2018</a:t>
             </a:fld>
             <a:endParaRPr lang="en-US"/>
           </a:p>
@@ -2570,10 +2569,9 @@
           </a:lstStyle>
           <a:p>
             <a:r>
-              <a:rPr lang="en-US" smtClean="0"/>
+              <a:rPr lang="en-US"/>
               <a:t>Click to edit Master title style</a:t>
             </a:r>
-            <a:endParaRPr lang="en-US"/>
           </a:p>
         </p:txBody>
       </p:sp>
@@ -2627,38 +2625,37 @@
           <a:p>
             <a:pPr lvl="0"/>
             <a:r>
-              <a:rPr lang="en-US" smtClean="0"/>
+              <a:rPr lang="en-US"/>
               <a:t>Click to edit Master text styles</a:t>
             </a:r>
           </a:p>
           <a:p>
             <a:pPr lvl="1"/>
             <a:r>
-              <a:rPr lang="en-US" smtClean="0"/>
+              <a:rPr lang="en-US"/>
               <a:t>Second level</a:t>
             </a:r>
           </a:p>
           <a:p>
             <a:pPr lvl="2"/>
             <a:r>
-              <a:rPr lang="en-US" smtClean="0"/>
+              <a:rPr lang="en-US"/>
               <a:t>Third level</a:t>
             </a:r>
           </a:p>
           <a:p>
             <a:pPr lvl="3"/>
             <a:r>
-              <a:rPr lang="en-US" smtClean="0"/>
+              <a:rPr lang="en-US"/>
               <a:t>Fourth level</a:t>
             </a:r>
           </a:p>
           <a:p>
             <a:pPr lvl="4"/>
             <a:r>
-              <a:rPr lang="en-US" smtClean="0"/>
+              <a:rPr lang="en-US"/>
               <a:t>Fifth level</a:t>
             </a:r>
-            <a:endParaRPr lang="en-US"/>
           </a:p>
         </p:txBody>
       </p:sp>
@@ -2721,7 +2718,7 @@
           <a:p>
             <a:pPr lvl="0"/>
             <a:r>
-              <a:rPr lang="en-US" smtClean="0"/>
+              <a:rPr lang="en-US"/>
               <a:t>Click to edit Master text styles</a:t>
             </a:r>
           </a:p>
@@ -2744,7 +2741,7 @@
           <a:p>
             <a:fld id="{9EC64373-BFDA-45AB-A1CB-3ABEFE139FC3}" type="datetimeFigureOut">
               <a:rPr lang="en-US" smtClean="0"/>
-              <a:t>1/4/2008</a:t>
+              <a:t>4/18/2018</a:t>
             </a:fld>
             <a:endParaRPr lang="en-US"/>
           </a:p>
@@ -2842,10 +2839,9 @@
           </a:lstStyle>
           <a:p>
             <a:r>
-              <a:rPr lang="en-US" smtClean="0"/>
+              <a:rPr lang="en-US"/>
               <a:t>Click to edit Master title style</a:t>
             </a:r>
-            <a:endParaRPr lang="en-US"/>
           </a:p>
         </p:txBody>
       </p:sp>
@@ -2969,7 +2965,7 @@
           <a:p>
             <a:pPr lvl="0"/>
             <a:r>
-              <a:rPr lang="en-US" smtClean="0"/>
+              <a:rPr lang="en-US"/>
               <a:t>Click to edit Master text styles</a:t>
             </a:r>
           </a:p>
@@ -2992,7 +2988,7 @@
           <a:p>
             <a:fld id="{9EC64373-BFDA-45AB-A1CB-3ABEFE139FC3}" type="datetimeFigureOut">
               <a:rPr lang="en-US" smtClean="0"/>
-              <a:t>1/4/2008</a:t>
+              <a:t>4/18/2018</a:t>
             </a:fld>
             <a:endParaRPr lang="en-US"/>
           </a:p>
@@ -3096,10 +3092,9 @@
           <a:lstStyle/>
           <a:p>
             <a:r>
-              <a:rPr lang="en-US" smtClean="0"/>
+              <a:rPr lang="en-US"/>
               <a:t>Click to edit Master title style</a:t>
             </a:r>
-            <a:endParaRPr lang="en-US"/>
           </a:p>
         </p:txBody>
       </p:sp>
@@ -3130,38 +3125,37 @@
           <a:p>
             <a:pPr lvl="0"/>
             <a:r>
-              <a:rPr lang="en-US" smtClean="0"/>
+              <a:rPr lang="en-US"/>
               <a:t>Click to edit Master text styles</a:t>
             </a:r>
           </a:p>
           <a:p>
             <a:pPr lvl="1"/>
             <a:r>
-              <a:rPr lang="en-US" smtClean="0"/>
+              <a:rPr lang="en-US"/>
               <a:t>Second level</a:t>
             </a:r>
           </a:p>
           <a:p>
             <a:pPr lvl="2"/>
             <a:r>
-              <a:rPr lang="en-US" smtClean="0"/>
+              <a:rPr lang="en-US"/>
               <a:t>Third level</a:t>
             </a:r>
           </a:p>
           <a:p>
             <a:pPr lvl="3"/>
             <a:r>
-              <a:rPr lang="en-US" smtClean="0"/>
+              <a:rPr lang="en-US"/>
               <a:t>Fourth level</a:t>
             </a:r>
           </a:p>
           <a:p>
             <a:pPr lvl="4"/>
             <a:r>
-              <a:rPr lang="en-US" smtClean="0"/>
+              <a:rPr lang="en-US"/>
               <a:t>Fifth level</a:t>
             </a:r>
-            <a:endParaRPr lang="en-US"/>
           </a:p>
         </p:txBody>
       </p:sp>
@@ -3200,7 +3194,7 @@
           <a:p>
             <a:fld id="{9EC64373-BFDA-45AB-A1CB-3ABEFE139FC3}" type="datetimeFigureOut">
               <a:rPr lang="en-US" smtClean="0"/>
-              <a:t>1/4/2008</a:t>
+              <a:t>4/18/2018</a:t>
             </a:fld>
             <a:endParaRPr lang="en-US"/>
           </a:p>
@@ -3572,7 +3566,7 @@
       </p:grpSpPr>
       <p:sp>
         <p:nvSpPr>
-          <p:cNvPr id="2" name="Title 1"/>
+          <p:cNvPr id="2" name="The Title"/>
           <p:cNvSpPr>
             <a:spLocks noGrp="1"/>
           </p:cNvSpPr>
@@ -3586,7 +3580,7 @@
           <a:lstStyle/>
           <a:p>
             <a:r>
-              <a:rPr lang="en-GB" dirty="0" smtClean="0"/>
+              <a:rPr lang="en-GB" dirty="0"/>
               <a:t>Title of the first slide</a:t>
             </a:r>
             <a:endParaRPr lang="en-US" dirty="0"/>
@@ -3595,7 +3589,7 @@
       </p:sp>
       <p:sp>
         <p:nvSpPr>
-          <p:cNvPr id="3" name="Subtitle 2"/>
+          <p:cNvPr id="3" name="Another Subtitle"/>
           <p:cNvSpPr>
             <a:spLocks noGrp="1"/>
           </p:cNvSpPr>
@@ -3609,7 +3603,7 @@
           <a:lstStyle/>
           <a:p>
             <a:r>
-              <a:rPr lang="en-GB" dirty="0" smtClean="0"/>
+              <a:rPr lang="en-GB" dirty="0"/>
               <a:t>Subtitle of the first slide</a:t>
             </a:r>
           </a:p>
@@ -3618,7 +3612,7 @@
           </a:p>
           <a:p>
             <a:r>
-              <a:rPr lang="en-GB" i="1" dirty="0" smtClean="0">
+              <a:rPr lang="en-GB" i="1" dirty="0">
                 <a:solidFill>
                   <a:srgbClr val="92D050"/>
                 </a:solidFill>
@@ -3674,7 +3668,7 @@
           <a:lstStyle/>
           <a:p>
             <a:r>
-              <a:rPr lang="en-GB" dirty="0" smtClean="0"/>
+              <a:rPr lang="en-GB" dirty="0"/>
               <a:t>This is the second slide</a:t>
             </a:r>
             <a:endParaRPr lang="en-US" dirty="0"/>
@@ -3697,19 +3691,19 @@
           <a:lstStyle/>
           <a:p>
             <a:r>
-              <a:rPr lang="en-GB" dirty="0" smtClean="0"/>
+              <a:rPr lang="en-GB" dirty="0"/>
               <a:t>It has bullet points on it</a:t>
             </a:r>
           </a:p>
           <a:p>
             <a:r>
-              <a:rPr lang="en-GB" dirty="0" smtClean="0"/>
+              <a:rPr lang="en-GB" dirty="0"/>
               <a:t>They’re fun, aren’t they?</a:t>
             </a:r>
           </a:p>
           <a:p>
             <a:r>
-              <a:rPr lang="en-GB" sz="1600" dirty="0" smtClean="0">
+              <a:rPr lang="en-GB" sz="1600" dirty="0">
                 <a:latin typeface="Arial Black" pitchFamily="34" charset="0"/>
               </a:rPr>
               <a:t>Especially in a different font like Arial Black at 16 point!</a:t>

</xml_diff>